<commit_message>
Thêm link tài liệu tham khảo
</commit_message>
<xml_diff>
--- a/SEMINAR/Seminar.pptx
+++ b/SEMINAR/Seminar.pptx
@@ -5,7 +5,7 @@
     <p:sldMasterId id="2147483648" r:id="rId1"/>
   </p:sldMasterIdLst>
   <p:notesMasterIdLst>
-    <p:notesMasterId r:id="rId16"/>
+    <p:notesMasterId r:id="rId17"/>
   </p:notesMasterIdLst>
   <p:sldIdLst>
     <p:sldId id="256" r:id="rId2"/>
@@ -21,7 +21,8 @@
     <p:sldId id="263" r:id="rId12"/>
     <p:sldId id="266" r:id="rId13"/>
     <p:sldId id="264" r:id="rId14"/>
-    <p:sldId id="282" r:id="rId15"/>
+    <p:sldId id="283" r:id="rId15"/>
+    <p:sldId id="282" r:id="rId16"/>
   </p:sldIdLst>
   <p:sldSz cx="12192000" cy="6858000"/>
   <p:notesSz cx="6858000" cy="9144000"/>
@@ -210,7 +211,7 @@
           <a:p>
             <a:fld id="{8D6F176A-20DB-419A-A316-CB18727BE9E7}" type="datetimeFigureOut">
               <a:rPr lang="en-US" smtClean="0"/>
-              <a:t>27/04/2018</a:t>
+              <a:t>14/05/2018</a:t>
             </a:fld>
             <a:endParaRPr lang="en-US"/>
           </a:p>
@@ -643,7 +644,7 @@
           <a:p>
             <a:fld id="{88D01429-BA7F-4469-87DB-0548295C10A9}" type="datetime1">
               <a:rPr lang="en-US" smtClean="0"/>
-              <a:t>27/04/2018</a:t>
+              <a:t>14/05/2018</a:t>
             </a:fld>
             <a:endParaRPr lang="en-US"/>
           </a:p>
@@ -950,7 +951,7 @@
           <a:p>
             <a:fld id="{52695B30-10D3-41F9-A859-BCD91930A355}" type="datetime1">
               <a:rPr lang="en-US" smtClean="0"/>
-              <a:t>27/04/2018</a:t>
+              <a:t>14/05/2018</a:t>
             </a:fld>
             <a:endParaRPr lang="en-US"/>
           </a:p>
@@ -1167,7 +1168,7 @@
           <a:p>
             <a:fld id="{83E69A3D-6127-46F6-9C7C-CC3A0E1FFDD1}" type="datetime1">
               <a:rPr lang="en-US" smtClean="0"/>
-              <a:t>27/04/2018</a:t>
+              <a:t>14/05/2018</a:t>
             </a:fld>
             <a:endParaRPr lang="en-US"/>
           </a:p>
@@ -1453,7 +1454,7 @@
           <a:p>
             <a:fld id="{99998E29-EE15-4B8F-AA0A-74E89FDE28FE}" type="datetime1">
               <a:rPr lang="en-US" smtClean="0"/>
-              <a:t>27/04/2018</a:t>
+              <a:t>14/05/2018</a:t>
             </a:fld>
             <a:endParaRPr lang="en-US"/>
           </a:p>
@@ -1902,7 +1903,7 @@
           <a:p>
             <a:fld id="{6DE933E9-C4D6-4372-91B7-E82F7D51DCB7}" type="datetime1">
               <a:rPr lang="en-US" smtClean="0"/>
-              <a:t>27/04/2018</a:t>
+              <a:t>14/05/2018</a:t>
             </a:fld>
             <a:endParaRPr lang="en-US"/>
           </a:p>
@@ -2473,7 +2474,7 @@
           <a:p>
             <a:fld id="{000E013C-2778-4DE1-8656-D1F69B4ABB07}" type="datetime1">
               <a:rPr lang="en-US" smtClean="0"/>
-              <a:t>27/04/2018</a:t>
+              <a:t>14/05/2018</a:t>
             </a:fld>
             <a:endParaRPr lang="en-US"/>
           </a:p>
@@ -3320,7 +3321,7 @@
           <a:p>
             <a:fld id="{C84298BA-0A92-4606-B9E1-7E80DE9546BF}" type="datetime1">
               <a:rPr lang="en-US" smtClean="0"/>
-              <a:t>27/04/2018</a:t>
+              <a:t>14/05/2018</a:t>
             </a:fld>
             <a:endParaRPr lang="en-US"/>
           </a:p>
@@ -3520,7 +3521,7 @@
           <a:p>
             <a:fld id="{D2583EDF-D5B5-43EA-A179-877D2932B254}" type="datetime1">
               <a:rPr lang="en-US" smtClean="0"/>
-              <a:t>27/04/2018</a:t>
+              <a:t>14/05/2018</a:t>
             </a:fld>
             <a:endParaRPr lang="en-US"/>
           </a:p>
@@ -3729,7 +3730,7 @@
           <a:p>
             <a:fld id="{74E557E1-0AEB-47C6-A698-960411513F23}" type="datetime1">
               <a:rPr lang="en-US" smtClean="0"/>
-              <a:t>27/04/2018</a:t>
+              <a:t>14/05/2018</a:t>
             </a:fld>
             <a:endParaRPr lang="en-US"/>
           </a:p>
@@ -3929,7 +3930,7 @@
           <a:p>
             <a:fld id="{4F54B63A-A422-47DF-8959-0F2BAFC78F5D}" type="datetime1">
               <a:rPr lang="en-US" smtClean="0"/>
-              <a:t>27/04/2018</a:t>
+              <a:t>14/05/2018</a:t>
             </a:fld>
             <a:endParaRPr lang="en-US"/>
           </a:p>
@@ -4204,7 +4205,7 @@
           <a:p>
             <a:fld id="{7AB1CA06-7AD4-4894-94AF-95E0E2513B72}" type="datetime1">
               <a:rPr lang="en-US" smtClean="0"/>
-              <a:t>27/04/2018</a:t>
+              <a:t>14/05/2018</a:t>
             </a:fld>
             <a:endParaRPr lang="en-US"/>
           </a:p>
@@ -4466,7 +4467,7 @@
           <a:p>
             <a:fld id="{02AFCF8F-6457-4E98-8A92-AD422F2DE2DD}" type="datetime1">
               <a:rPr lang="en-US" smtClean="0"/>
-              <a:t>27/04/2018</a:t>
+              <a:t>14/05/2018</a:t>
             </a:fld>
             <a:endParaRPr lang="en-US"/>
           </a:p>
@@ -4876,7 +4877,7 @@
           <a:p>
             <a:fld id="{B78901DD-A918-4B09-99CB-D4559AE441DE}" type="datetime1">
               <a:rPr lang="en-US" smtClean="0"/>
-              <a:t>27/04/2018</a:t>
+              <a:t>14/05/2018</a:t>
             </a:fld>
             <a:endParaRPr lang="en-US"/>
           </a:p>
@@ -5019,7 +5020,7 @@
           <a:p>
             <a:fld id="{CD8A6D92-F2D7-4404-B25E-944AA2355307}" type="datetime1">
               <a:rPr lang="en-US" smtClean="0"/>
-              <a:t>27/04/2018</a:t>
+              <a:t>14/05/2018</a:t>
             </a:fld>
             <a:endParaRPr lang="en-US"/>
           </a:p>
@@ -5139,7 +5140,7 @@
           <a:p>
             <a:fld id="{1AAE86A8-E964-4873-8C46-7ECA4F2106B8}" type="datetime1">
               <a:rPr lang="en-US" smtClean="0"/>
-              <a:t>27/04/2018</a:t>
+              <a:t>14/05/2018</a:t>
             </a:fld>
             <a:endParaRPr lang="en-US"/>
           </a:p>
@@ -5413,7 +5414,7 @@
           <a:p>
             <a:fld id="{7B3420EA-0922-44EA-9E5F-D072AE7DE1A3}" type="datetime1">
               <a:rPr lang="en-US" smtClean="0"/>
-              <a:t>27/04/2018</a:t>
+              <a:t>14/05/2018</a:t>
             </a:fld>
             <a:endParaRPr lang="en-US"/>
           </a:p>
@@ -5720,7 +5721,7 @@
           <a:p>
             <a:fld id="{31D63C95-EB5A-4B80-86C7-AC8D2A04E2B5}" type="datetime1">
               <a:rPr lang="en-US" smtClean="0"/>
-              <a:t>27/04/2018</a:t>
+              <a:t>14/05/2018</a:t>
             </a:fld>
             <a:endParaRPr lang="en-US"/>
           </a:p>
@@ -5967,7 +5968,7 @@
           <a:p>
             <a:fld id="{33E8DCB2-3C86-4671-9450-C782F1601F56}" type="datetime1">
               <a:rPr lang="en-US" smtClean="0"/>
-              <a:t>27/04/2018</a:t>
+              <a:t>14/05/2018</a:t>
             </a:fld>
             <a:endParaRPr lang="en-US"/>
           </a:p>
@@ -7499,7 +7500,7 @@
         <p:spPr>
           <a:xfrm>
             <a:off x="4598505" y="2138287"/>
-            <a:ext cx="6705400" cy="2784475"/>
+            <a:ext cx="6705400" cy="2785378"/>
           </a:xfrm>
           <a:prstGeom prst="rect">
             <a:avLst/>
@@ -8277,7 +8278,7 @@
                 <a:ea typeface="Tahoma" panose="020B0604030504040204" pitchFamily="34" charset="0"/>
                 <a:cs typeface="Tahoma" panose="020B0604030504040204" pitchFamily="34" charset="0"/>
               </a:rPr>
-              <a:t> </a:t>
+              <a:t> hay </a:t>
             </a:r>
             <a:r>
               <a:rPr lang="en-GB" sz="2500" dirty="0" err="1">
@@ -8285,7 +8286,7 @@
                 <a:ea typeface="Tahoma" panose="020B0604030504040204" pitchFamily="34" charset="0"/>
                 <a:cs typeface="Tahoma" panose="020B0604030504040204" pitchFamily="34" charset="0"/>
               </a:rPr>
-              <a:t>phức</a:t>
+              <a:t>thay</a:t>
             </a:r>
             <a:r>
               <a:rPr lang="en-GB" sz="2500" dirty="0">
@@ -8301,7 +8302,7 @@
                 <a:ea typeface="Tahoma" panose="020B0604030504040204" pitchFamily="34" charset="0"/>
                 <a:cs typeface="Tahoma" panose="020B0604030504040204" pitchFamily="34" charset="0"/>
               </a:rPr>
-              <a:t>tạp</a:t>
+              <a:t>đổi</a:t>
             </a:r>
             <a:r>
               <a:rPr lang="en-GB" sz="2500" dirty="0">
@@ -8309,7 +8310,7 @@
                 <a:ea typeface="Tahoma" panose="020B0604030504040204" pitchFamily="34" charset="0"/>
                 <a:cs typeface="Tahoma" panose="020B0604030504040204" pitchFamily="34" charset="0"/>
               </a:rPr>
-              <a:t>, </a:t>
+              <a:t> </a:t>
             </a:r>
             <a:r>
               <a:rPr lang="en-GB" sz="2500" dirty="0" err="1">
@@ -8317,7 +8318,7 @@
                 <a:ea typeface="Tahoma" panose="020B0604030504040204" pitchFamily="34" charset="0"/>
                 <a:cs typeface="Tahoma" panose="020B0604030504040204" pitchFamily="34" charset="0"/>
               </a:rPr>
-              <a:t>hướng</a:t>
+              <a:t>yêu</a:t>
             </a:r>
             <a:r>
               <a:rPr lang="en-GB" sz="2500" dirty="0">
@@ -8333,103 +8334,7 @@
                 <a:ea typeface="Tahoma" panose="020B0604030504040204" pitchFamily="34" charset="0"/>
                 <a:cs typeface="Tahoma" panose="020B0604030504040204" pitchFamily="34" charset="0"/>
               </a:rPr>
-              <a:t>đối</a:t>
-            </a:r>
-            <a:r>
-              <a:rPr lang="en-GB" sz="2500" dirty="0">
-                <a:latin typeface="Times New Roman" panose="02020603050405020304" pitchFamily="18" charset="0"/>
-                <a:ea typeface="Tahoma" panose="020B0604030504040204" pitchFamily="34" charset="0"/>
-                <a:cs typeface="Tahoma" panose="020B0604030504040204" pitchFamily="34" charset="0"/>
-              </a:rPr>
-              <a:t> </a:t>
-            </a:r>
-            <a:r>
-              <a:rPr lang="en-GB" sz="2500" dirty="0" err="1">
-                <a:latin typeface="Times New Roman" panose="02020603050405020304" pitchFamily="18" charset="0"/>
-                <a:ea typeface="Tahoma" panose="020B0604030504040204" pitchFamily="34" charset="0"/>
-                <a:cs typeface="Tahoma" panose="020B0604030504040204" pitchFamily="34" charset="0"/>
-              </a:rPr>
-              <a:t>tượng</a:t>
-            </a:r>
-            <a:r>
-              <a:rPr lang="en-GB" sz="2500" dirty="0">
-                <a:latin typeface="Times New Roman" panose="02020603050405020304" pitchFamily="18" charset="0"/>
-                <a:ea typeface="Tahoma" panose="020B0604030504040204" pitchFamily="34" charset="0"/>
-                <a:cs typeface="Tahoma" panose="020B0604030504040204" pitchFamily="34" charset="0"/>
-              </a:rPr>
-              <a:t> </a:t>
-            </a:r>
-            <a:r>
-              <a:rPr lang="en-GB" sz="2500" dirty="0" err="1">
-                <a:latin typeface="Times New Roman" panose="02020603050405020304" pitchFamily="18" charset="0"/>
-                <a:ea typeface="Tahoma" panose="020B0604030504040204" pitchFamily="34" charset="0"/>
-                <a:cs typeface="Tahoma" panose="020B0604030504040204" pitchFamily="34" charset="0"/>
-              </a:rPr>
-              <a:t>và</a:t>
-            </a:r>
-            <a:r>
-              <a:rPr lang="en-GB" sz="2500" dirty="0">
-                <a:latin typeface="Times New Roman" panose="02020603050405020304" pitchFamily="18" charset="0"/>
-                <a:ea typeface="Tahoma" panose="020B0604030504040204" pitchFamily="34" charset="0"/>
-                <a:cs typeface="Tahoma" panose="020B0604030504040204" pitchFamily="34" charset="0"/>
-              </a:rPr>
-              <a:t> </a:t>
-            </a:r>
-            <a:r>
-              <a:rPr lang="en-GB" sz="2500" dirty="0" err="1">
-                <a:latin typeface="Times New Roman" panose="02020603050405020304" pitchFamily="18" charset="0"/>
-                <a:ea typeface="Tahoma" panose="020B0604030504040204" pitchFamily="34" charset="0"/>
-                <a:cs typeface="Tahoma" panose="020B0604030504040204" pitchFamily="34" charset="0"/>
-              </a:rPr>
-              <a:t>dự</a:t>
-            </a:r>
-            <a:r>
-              <a:rPr lang="en-GB" sz="2500" dirty="0">
-                <a:latin typeface="Times New Roman" panose="02020603050405020304" pitchFamily="18" charset="0"/>
-                <a:ea typeface="Tahoma" panose="020B0604030504040204" pitchFamily="34" charset="0"/>
-                <a:cs typeface="Tahoma" panose="020B0604030504040204" pitchFamily="34" charset="0"/>
-              </a:rPr>
-              <a:t> </a:t>
-            </a:r>
-            <a:r>
-              <a:rPr lang="en-GB" sz="2500" dirty="0" err="1">
-                <a:latin typeface="Times New Roman" panose="02020603050405020304" pitchFamily="18" charset="0"/>
-                <a:ea typeface="Tahoma" panose="020B0604030504040204" pitchFamily="34" charset="0"/>
-                <a:cs typeface="Tahoma" panose="020B0604030504040204" pitchFamily="34" charset="0"/>
-              </a:rPr>
-              <a:t>án</a:t>
-            </a:r>
-            <a:r>
-              <a:rPr lang="en-GB" sz="2500" dirty="0">
-                <a:latin typeface="Times New Roman" panose="02020603050405020304" pitchFamily="18" charset="0"/>
-                <a:ea typeface="Tahoma" panose="020B0604030504040204" pitchFamily="34" charset="0"/>
-                <a:cs typeface="Tahoma" panose="020B0604030504040204" pitchFamily="34" charset="0"/>
-              </a:rPr>
-              <a:t> </a:t>
-            </a:r>
-            <a:r>
-              <a:rPr lang="en-GB" sz="2500" dirty="0" err="1">
-                <a:latin typeface="Times New Roman" panose="02020603050405020304" pitchFamily="18" charset="0"/>
-                <a:ea typeface="Tahoma" panose="020B0604030504040204" pitchFamily="34" charset="0"/>
-                <a:cs typeface="Tahoma" panose="020B0604030504040204" pitchFamily="34" charset="0"/>
-              </a:rPr>
-              <a:t>dài</a:t>
-            </a:r>
-            <a:r>
-              <a:rPr lang="en-GB" sz="2500" dirty="0">
-                <a:latin typeface="Times New Roman" panose="02020603050405020304" pitchFamily="18" charset="0"/>
-                <a:ea typeface="Tahoma" panose="020B0604030504040204" pitchFamily="34" charset="0"/>
-                <a:cs typeface="Tahoma" panose="020B0604030504040204" pitchFamily="34" charset="0"/>
-              </a:rPr>
-              <a:t> </a:t>
-            </a:r>
-            <a:r>
-              <a:rPr lang="en-GB" sz="2500" dirty="0" err="1">
-                <a:latin typeface="Times New Roman" panose="02020603050405020304" pitchFamily="18" charset="0"/>
-                <a:ea typeface="Tahoma" panose="020B0604030504040204" pitchFamily="34" charset="0"/>
-                <a:cs typeface="Tahoma" panose="020B0604030504040204" pitchFamily="34" charset="0"/>
-              </a:rPr>
-              <a:t>hạn</a:t>
+              <a:t>cầu</a:t>
             </a:r>
             <a:r>
               <a:rPr lang="en-GB" sz="2500" dirty="0">
@@ -12164,6 +12069,663 @@
           <p:cNvPr id="4" name="Slide Number Placeholder 3">
             <a:extLst>
               <a:ext uri="{FF2B5EF4-FFF2-40B4-BE49-F238E27FC236}">
+                <a16:creationId xmlns:a16="http://schemas.microsoft.com/office/drawing/2014/main" id="{CF1034B9-DE2B-4F0B-9C51-7A7F12AB0AAA}"/>
+              </a:ext>
+            </a:extLst>
+          </p:cNvPr>
+          <p:cNvSpPr>
+            <a:spLocks noGrp="1"/>
+          </p:cNvSpPr>
+          <p:nvPr>
+            <p:ph type="sldNum" sz="quarter" idx="12"/>
+          </p:nvPr>
+        </p:nvSpPr>
+        <p:spPr/>
+        <p:txBody>
+          <a:bodyPr/>
+          <a:lstStyle/>
+          <a:p>
+            <a:fld id="{6BB9AED3-D2BB-49A3-B8E7-A4A64ED2F011}" type="slidenum">
+              <a:rPr lang="en-US" smtClean="0"/>
+              <a:t>14</a:t>
+            </a:fld>
+            <a:endParaRPr lang="en-US"/>
+          </a:p>
+        </p:txBody>
+      </p:sp>
+      <p:sp>
+        <p:nvSpPr>
+          <p:cNvPr id="5" name="TextBox 4">
+            <a:extLst>
+              <a:ext uri="{FF2B5EF4-FFF2-40B4-BE49-F238E27FC236}">
+                <a16:creationId xmlns:a16="http://schemas.microsoft.com/office/drawing/2014/main" id="{472269C0-DEC8-4F1F-8FA0-6D6BE8264296}"/>
+              </a:ext>
+            </a:extLst>
+          </p:cNvPr>
+          <p:cNvSpPr txBox="1"/>
+          <p:nvPr/>
+        </p:nvSpPr>
+        <p:spPr>
+          <a:xfrm>
+            <a:off x="1272209" y="1033670"/>
+            <a:ext cx="10177669" cy="5386090"/>
+          </a:xfrm>
+          <a:prstGeom prst="rect">
+            <a:avLst/>
+          </a:prstGeom>
+          <a:noFill/>
+        </p:spPr>
+        <p:txBody>
+          <a:bodyPr wrap="square" rtlCol="0">
+            <a:spAutoFit/>
+          </a:bodyPr>
+          <a:lstStyle/>
+          <a:p>
+            <a:r>
+              <a:rPr lang="en-US" sz="2500" dirty="0" err="1">
+                <a:latin typeface="Times New Roman" panose="02020603050405020304" pitchFamily="18" charset="0"/>
+                <a:cs typeface="Times New Roman" panose="02020603050405020304" pitchFamily="18" charset="0"/>
+              </a:rPr>
+              <a:t>Hình</a:t>
+            </a:r>
+            <a:r>
+              <a:rPr lang="en-US" sz="2500" dirty="0">
+                <a:latin typeface="Times New Roman" panose="02020603050405020304" pitchFamily="18" charset="0"/>
+                <a:cs typeface="Times New Roman" panose="02020603050405020304" pitchFamily="18" charset="0"/>
+              </a:rPr>
+              <a:t> </a:t>
+            </a:r>
+            <a:r>
+              <a:rPr lang="en-US" sz="2500" dirty="0" err="1">
+                <a:latin typeface="Times New Roman" panose="02020603050405020304" pitchFamily="18" charset="0"/>
+                <a:cs typeface="Times New Roman" panose="02020603050405020304" pitchFamily="18" charset="0"/>
+              </a:rPr>
+              <a:t>ảnh</a:t>
+            </a:r>
+            <a:r>
+              <a:rPr lang="en-US" sz="2500" dirty="0">
+                <a:latin typeface="Times New Roman" panose="02020603050405020304" pitchFamily="18" charset="0"/>
+                <a:cs typeface="Times New Roman" panose="02020603050405020304" pitchFamily="18" charset="0"/>
+              </a:rPr>
+              <a:t> </a:t>
+            </a:r>
+            <a:r>
+              <a:rPr lang="en-US" sz="2500" dirty="0" err="1">
+                <a:latin typeface="Times New Roman" panose="02020603050405020304" pitchFamily="18" charset="0"/>
+                <a:cs typeface="Times New Roman" panose="02020603050405020304" pitchFamily="18" charset="0"/>
+              </a:rPr>
+              <a:t>tham</a:t>
+            </a:r>
+            <a:r>
+              <a:rPr lang="en-US" sz="2500" dirty="0">
+                <a:latin typeface="Times New Roman" panose="02020603050405020304" pitchFamily="18" charset="0"/>
+                <a:cs typeface="Times New Roman" panose="02020603050405020304" pitchFamily="18" charset="0"/>
+              </a:rPr>
+              <a:t> </a:t>
+            </a:r>
+            <a:r>
+              <a:rPr lang="en-US" sz="2500" dirty="0" err="1">
+                <a:latin typeface="Times New Roman" panose="02020603050405020304" pitchFamily="18" charset="0"/>
+                <a:cs typeface="Times New Roman" panose="02020603050405020304" pitchFamily="18" charset="0"/>
+              </a:rPr>
+              <a:t>khảo</a:t>
+            </a:r>
+            <a:r>
+              <a:rPr lang="en-US" sz="2500" dirty="0">
+                <a:latin typeface="Times New Roman" panose="02020603050405020304" pitchFamily="18" charset="0"/>
+                <a:cs typeface="Times New Roman" panose="02020603050405020304" pitchFamily="18" charset="0"/>
+              </a:rPr>
+              <a:t>:</a:t>
+            </a:r>
+          </a:p>
+          <a:p>
+            <a:pPr marL="285750" indent="-285750">
+              <a:buFontTx/>
+              <a:buChar char="-"/>
+            </a:pPr>
+            <a:r>
+              <a:rPr lang="en-US" sz="2000" dirty="0">
+                <a:latin typeface="Times New Roman" panose="02020603050405020304" pitchFamily="18" charset="0"/>
+                <a:cs typeface="Times New Roman" panose="02020603050405020304" pitchFamily="18" charset="0"/>
+                <a:hlinkClick r:id="rId2"/>
+              </a:rPr>
+              <a:t>https://goo.gl/e1oGxC</a:t>
+            </a:r>
+            <a:endParaRPr lang="en-US" sz="2000" dirty="0">
+              <a:latin typeface="Times New Roman" panose="02020603050405020304" pitchFamily="18" charset="0"/>
+              <a:cs typeface="Times New Roman" panose="02020603050405020304" pitchFamily="18" charset="0"/>
+            </a:endParaRPr>
+          </a:p>
+          <a:p>
+            <a:pPr marL="285750" indent="-285750">
+              <a:buFontTx/>
+              <a:buChar char="-"/>
+            </a:pPr>
+            <a:r>
+              <a:rPr lang="en-US" sz="2000" dirty="0">
+                <a:latin typeface="Times New Roman" panose="02020603050405020304" pitchFamily="18" charset="0"/>
+                <a:cs typeface="Times New Roman" panose="02020603050405020304" pitchFamily="18" charset="0"/>
+                <a:hlinkClick r:id="rId3"/>
+              </a:rPr>
+              <a:t>https://goo.gl/hWt6AS</a:t>
+            </a:r>
+            <a:endParaRPr lang="en-US" sz="2000" dirty="0">
+              <a:latin typeface="Times New Roman" panose="02020603050405020304" pitchFamily="18" charset="0"/>
+              <a:cs typeface="Times New Roman" panose="02020603050405020304" pitchFamily="18" charset="0"/>
+            </a:endParaRPr>
+          </a:p>
+          <a:p>
+            <a:pPr marL="285750" indent="-285750">
+              <a:buFontTx/>
+              <a:buChar char="-"/>
+            </a:pPr>
+            <a:r>
+              <a:rPr lang="en-US" sz="2000" dirty="0">
+                <a:latin typeface="Times New Roman" panose="02020603050405020304" pitchFamily="18" charset="0"/>
+                <a:cs typeface="Times New Roman" panose="02020603050405020304" pitchFamily="18" charset="0"/>
+                <a:hlinkClick r:id="rId4"/>
+              </a:rPr>
+              <a:t>https://goo.gl/5ZGVu3</a:t>
+            </a:r>
+            <a:endParaRPr lang="en-US" sz="2000" dirty="0">
+              <a:latin typeface="Times New Roman" panose="02020603050405020304" pitchFamily="18" charset="0"/>
+              <a:cs typeface="Times New Roman" panose="02020603050405020304" pitchFamily="18" charset="0"/>
+            </a:endParaRPr>
+          </a:p>
+          <a:p>
+            <a:pPr marL="285750" indent="-285750">
+              <a:buFontTx/>
+              <a:buChar char="-"/>
+            </a:pPr>
+            <a:r>
+              <a:rPr lang="en-US" sz="2000" dirty="0">
+                <a:latin typeface="Times New Roman" panose="02020603050405020304" pitchFamily="18" charset="0"/>
+                <a:cs typeface="Times New Roman" panose="02020603050405020304" pitchFamily="18" charset="0"/>
+                <a:hlinkClick r:id="rId5"/>
+              </a:rPr>
+              <a:t>https://goo.gl/HPHKPt</a:t>
+            </a:r>
+            <a:endParaRPr lang="en-US" sz="2000" dirty="0">
+              <a:latin typeface="Times New Roman" panose="02020603050405020304" pitchFamily="18" charset="0"/>
+              <a:cs typeface="Times New Roman" panose="02020603050405020304" pitchFamily="18" charset="0"/>
+            </a:endParaRPr>
+          </a:p>
+          <a:p>
+            <a:pPr marL="285750" indent="-285750">
+              <a:buFontTx/>
+              <a:buChar char="-"/>
+            </a:pPr>
+            <a:r>
+              <a:rPr lang="en-US" sz="2000" dirty="0">
+                <a:latin typeface="Times New Roman" panose="02020603050405020304" pitchFamily="18" charset="0"/>
+                <a:cs typeface="Times New Roman" panose="02020603050405020304" pitchFamily="18" charset="0"/>
+                <a:hlinkClick r:id="rId6"/>
+              </a:rPr>
+              <a:t>https://goo.gl/KbsKB7</a:t>
+            </a:r>
+            <a:endParaRPr lang="en-US" sz="2000" dirty="0">
+              <a:latin typeface="Times New Roman" panose="02020603050405020304" pitchFamily="18" charset="0"/>
+              <a:cs typeface="Times New Roman" panose="02020603050405020304" pitchFamily="18" charset="0"/>
+            </a:endParaRPr>
+          </a:p>
+          <a:p>
+            <a:pPr marL="285750" indent="-285750">
+              <a:buFontTx/>
+              <a:buChar char="-"/>
+            </a:pPr>
+            <a:r>
+              <a:rPr lang="en-US" sz="2000" dirty="0">
+                <a:latin typeface="Times New Roman" panose="02020603050405020304" pitchFamily="18" charset="0"/>
+                <a:cs typeface="Times New Roman" panose="02020603050405020304" pitchFamily="18" charset="0"/>
+                <a:hlinkClick r:id="rId7"/>
+              </a:rPr>
+              <a:t>https://goo.gl/ZAsB75</a:t>
+            </a:r>
+            <a:endParaRPr lang="en-US" sz="2000" dirty="0">
+              <a:latin typeface="Times New Roman" panose="02020603050405020304" pitchFamily="18" charset="0"/>
+              <a:cs typeface="Times New Roman" panose="02020603050405020304" pitchFamily="18" charset="0"/>
+            </a:endParaRPr>
+          </a:p>
+          <a:p>
+            <a:pPr marL="285750" indent="-285750">
+              <a:buFontTx/>
+              <a:buChar char="-"/>
+            </a:pPr>
+            <a:r>
+              <a:rPr lang="en-US" sz="2000" dirty="0">
+                <a:latin typeface="Times New Roman" panose="02020603050405020304" pitchFamily="18" charset="0"/>
+                <a:cs typeface="Times New Roman" panose="02020603050405020304" pitchFamily="18" charset="0"/>
+                <a:hlinkClick r:id="rId8"/>
+              </a:rPr>
+              <a:t>https://goo.gl/ojSemP</a:t>
+            </a:r>
+            <a:endParaRPr lang="en-US" sz="2000" dirty="0">
+              <a:latin typeface="Times New Roman" panose="02020603050405020304" pitchFamily="18" charset="0"/>
+              <a:cs typeface="Times New Roman" panose="02020603050405020304" pitchFamily="18" charset="0"/>
+            </a:endParaRPr>
+          </a:p>
+          <a:p>
+            <a:pPr marL="285750" indent="-285750">
+              <a:buFontTx/>
+              <a:buChar char="-"/>
+            </a:pPr>
+            <a:r>
+              <a:rPr lang="en-US" sz="2000" dirty="0">
+                <a:latin typeface="Times New Roman" panose="02020603050405020304" pitchFamily="18" charset="0"/>
+                <a:cs typeface="Times New Roman" panose="02020603050405020304" pitchFamily="18" charset="0"/>
+                <a:hlinkClick r:id="rId9"/>
+              </a:rPr>
+              <a:t>https://goo.gl/BV7uHd</a:t>
+            </a:r>
+            <a:endParaRPr lang="en-US" sz="2000" dirty="0">
+              <a:latin typeface="Times New Roman" panose="02020603050405020304" pitchFamily="18" charset="0"/>
+              <a:cs typeface="Times New Roman" panose="02020603050405020304" pitchFamily="18" charset="0"/>
+            </a:endParaRPr>
+          </a:p>
+          <a:p>
+            <a:pPr marL="285750" indent="-285750">
+              <a:buFontTx/>
+              <a:buChar char="-"/>
+            </a:pPr>
+            <a:r>
+              <a:rPr lang="en-US" sz="2000" dirty="0">
+                <a:latin typeface="Times New Roman" panose="02020603050405020304" pitchFamily="18" charset="0"/>
+                <a:cs typeface="Times New Roman" panose="02020603050405020304" pitchFamily="18" charset="0"/>
+                <a:hlinkClick r:id="rId10"/>
+              </a:rPr>
+              <a:t>https://goo.gl/moTyUR</a:t>
+            </a:r>
+            <a:endParaRPr lang="en-US" sz="2000" dirty="0">
+              <a:latin typeface="Times New Roman" panose="02020603050405020304" pitchFamily="18" charset="0"/>
+              <a:cs typeface="Times New Roman" panose="02020603050405020304" pitchFamily="18" charset="0"/>
+            </a:endParaRPr>
+          </a:p>
+          <a:p>
+            <a:endParaRPr lang="en-US" sz="2000" dirty="0">
+              <a:latin typeface="Times New Roman" panose="02020603050405020304" pitchFamily="18" charset="0"/>
+              <a:cs typeface="Times New Roman" panose="02020603050405020304" pitchFamily="18" charset="0"/>
+            </a:endParaRPr>
+          </a:p>
+          <a:p>
+            <a:r>
+              <a:rPr lang="en-US" sz="2500" dirty="0" err="1">
+                <a:latin typeface="Times New Roman" panose="02020603050405020304" pitchFamily="18" charset="0"/>
+                <a:cs typeface="Times New Roman" panose="02020603050405020304" pitchFamily="18" charset="0"/>
+              </a:rPr>
+              <a:t>Tài</a:t>
+            </a:r>
+            <a:r>
+              <a:rPr lang="en-US" sz="2500" dirty="0">
+                <a:latin typeface="Times New Roman" panose="02020603050405020304" pitchFamily="18" charset="0"/>
+                <a:cs typeface="Times New Roman" panose="02020603050405020304" pitchFamily="18" charset="0"/>
+              </a:rPr>
+              <a:t> </a:t>
+            </a:r>
+            <a:r>
+              <a:rPr lang="en-US" sz="2500" dirty="0" err="1">
+                <a:latin typeface="Times New Roman" panose="02020603050405020304" pitchFamily="18" charset="0"/>
+                <a:cs typeface="Times New Roman" panose="02020603050405020304" pitchFamily="18" charset="0"/>
+              </a:rPr>
+              <a:t>liệu</a:t>
+            </a:r>
+            <a:r>
+              <a:rPr lang="en-US" sz="2500" dirty="0">
+                <a:latin typeface="Times New Roman" panose="02020603050405020304" pitchFamily="18" charset="0"/>
+                <a:cs typeface="Times New Roman" panose="02020603050405020304" pitchFamily="18" charset="0"/>
+              </a:rPr>
+              <a:t> </a:t>
+            </a:r>
+            <a:r>
+              <a:rPr lang="en-US" sz="2500" dirty="0" err="1">
+                <a:latin typeface="Times New Roman" panose="02020603050405020304" pitchFamily="18" charset="0"/>
+                <a:cs typeface="Times New Roman" panose="02020603050405020304" pitchFamily="18" charset="0"/>
+              </a:rPr>
+              <a:t>tham</a:t>
+            </a:r>
+            <a:r>
+              <a:rPr lang="en-US" sz="2500" dirty="0">
+                <a:latin typeface="Times New Roman" panose="02020603050405020304" pitchFamily="18" charset="0"/>
+                <a:cs typeface="Times New Roman" panose="02020603050405020304" pitchFamily="18" charset="0"/>
+              </a:rPr>
+              <a:t> </a:t>
+            </a:r>
+            <a:r>
+              <a:rPr lang="en-US" sz="2500" dirty="0" err="1">
+                <a:latin typeface="Times New Roman" panose="02020603050405020304" pitchFamily="18" charset="0"/>
+                <a:cs typeface="Times New Roman" panose="02020603050405020304" pitchFamily="18" charset="0"/>
+              </a:rPr>
+              <a:t>khảo</a:t>
+            </a:r>
+            <a:r>
+              <a:rPr lang="en-US" sz="2500" dirty="0">
+                <a:latin typeface="Times New Roman" panose="02020603050405020304" pitchFamily="18" charset="0"/>
+                <a:cs typeface="Times New Roman" panose="02020603050405020304" pitchFamily="18" charset="0"/>
+              </a:rPr>
+              <a:t>: </a:t>
+            </a:r>
+          </a:p>
+          <a:p>
+            <a:pPr marL="285750" indent="-285750">
+              <a:buFontTx/>
+              <a:buChar char="-"/>
+            </a:pPr>
+            <a:r>
+              <a:rPr lang="en-US" sz="2000" dirty="0">
+                <a:latin typeface="Times New Roman" panose="02020603050405020304" pitchFamily="18" charset="0"/>
+                <a:cs typeface="Times New Roman" panose="02020603050405020304" pitchFamily="18" charset="0"/>
+                <a:hlinkClick r:id="rId11"/>
+              </a:rPr>
+              <a:t>https://goo.gl</a:t>
+            </a:r>
+            <a:r>
+              <a:rPr lang="en-US" sz="2000">
+                <a:latin typeface="Times New Roman" panose="02020603050405020304" pitchFamily="18" charset="0"/>
+                <a:cs typeface="Times New Roman" panose="02020603050405020304" pitchFamily="18" charset="0"/>
+                <a:hlinkClick r:id="rId11"/>
+              </a:rPr>
+              <a:t>/LFubSv</a:t>
+            </a:r>
+            <a:endParaRPr lang="en-US" sz="2000" dirty="0">
+              <a:latin typeface="Times New Roman" panose="02020603050405020304" pitchFamily="18" charset="0"/>
+              <a:cs typeface="Times New Roman" panose="02020603050405020304" pitchFamily="18" charset="0"/>
+            </a:endParaRPr>
+          </a:p>
+          <a:p>
+            <a:pPr marL="285750" indent="-285750">
+              <a:buFontTx/>
+              <a:buChar char="-"/>
+            </a:pPr>
+            <a:r>
+              <a:rPr lang="en-US" sz="2000">
+                <a:latin typeface="Times New Roman" panose="02020603050405020304" pitchFamily="18" charset="0"/>
+                <a:cs typeface="Times New Roman" panose="02020603050405020304" pitchFamily="18" charset="0"/>
+              </a:rPr>
+              <a:t>Slide </a:t>
+            </a:r>
+            <a:r>
+              <a:rPr lang="en-US" sz="2000" dirty="0">
+                <a:latin typeface="Times New Roman" panose="02020603050405020304" pitchFamily="18" charset="0"/>
+                <a:cs typeface="Times New Roman" panose="02020603050405020304" pitchFamily="18" charset="0"/>
+              </a:rPr>
+              <a:t>ChSE2-Quytrinh, </a:t>
+            </a:r>
+            <a:r>
+              <a:rPr lang="en-US" sz="2000" dirty="0" err="1">
+                <a:latin typeface="Times New Roman" panose="02020603050405020304" pitchFamily="18" charset="0"/>
+                <a:cs typeface="Times New Roman" panose="02020603050405020304" pitchFamily="18" charset="0"/>
+              </a:rPr>
+              <a:t>tác</a:t>
+            </a:r>
+            <a:r>
+              <a:rPr lang="en-US" sz="2000" dirty="0">
+                <a:latin typeface="Times New Roman" panose="02020603050405020304" pitchFamily="18" charset="0"/>
+                <a:cs typeface="Times New Roman" panose="02020603050405020304" pitchFamily="18" charset="0"/>
+              </a:rPr>
+              <a:t> </a:t>
+            </a:r>
+            <a:r>
+              <a:rPr lang="en-US" sz="2000" dirty="0" err="1">
+                <a:latin typeface="Times New Roman" panose="02020603050405020304" pitchFamily="18" charset="0"/>
+                <a:cs typeface="Times New Roman" panose="02020603050405020304" pitchFamily="18" charset="0"/>
+              </a:rPr>
+              <a:t>giả</a:t>
+            </a:r>
+            <a:r>
+              <a:rPr lang="en-US" sz="2000" dirty="0">
+                <a:latin typeface="Times New Roman" panose="02020603050405020304" pitchFamily="18" charset="0"/>
+                <a:cs typeface="Times New Roman" panose="02020603050405020304" pitchFamily="18" charset="0"/>
+              </a:rPr>
+              <a:t>: </a:t>
+            </a:r>
+            <a:r>
+              <a:rPr lang="en-US" sz="2000" dirty="0" err="1">
+                <a:latin typeface="Times New Roman" panose="02020603050405020304" pitchFamily="18" charset="0"/>
+                <a:cs typeface="Times New Roman" panose="02020603050405020304" pitchFamily="18" charset="0"/>
+              </a:rPr>
+              <a:t>Th.S</a:t>
+            </a:r>
+            <a:r>
+              <a:rPr lang="en-US" sz="2000" dirty="0">
+                <a:latin typeface="Times New Roman" panose="02020603050405020304" pitchFamily="18" charset="0"/>
+                <a:cs typeface="Times New Roman" panose="02020603050405020304" pitchFamily="18" charset="0"/>
+              </a:rPr>
+              <a:t> </a:t>
+            </a:r>
+            <a:r>
+              <a:rPr lang="en-US" sz="2000" dirty="0" err="1">
+                <a:latin typeface="Times New Roman" panose="02020603050405020304" pitchFamily="18" charset="0"/>
+                <a:cs typeface="Times New Roman" panose="02020603050405020304" pitchFamily="18" charset="0"/>
+              </a:rPr>
+              <a:t>Nguyễn</a:t>
+            </a:r>
+            <a:r>
+              <a:rPr lang="en-US" sz="2000" dirty="0">
+                <a:latin typeface="Times New Roman" panose="02020603050405020304" pitchFamily="18" charset="0"/>
+                <a:cs typeface="Times New Roman" panose="02020603050405020304" pitchFamily="18" charset="0"/>
+              </a:rPr>
+              <a:t> </a:t>
+            </a:r>
+            <a:r>
+              <a:rPr lang="en-US" sz="2000" dirty="0" err="1">
+                <a:latin typeface="Times New Roman" panose="02020603050405020304" pitchFamily="18" charset="0"/>
+                <a:cs typeface="Times New Roman" panose="02020603050405020304" pitchFamily="18" charset="0"/>
+              </a:rPr>
+              <a:t>Thị</a:t>
+            </a:r>
+            <a:r>
+              <a:rPr lang="en-US" sz="2000" dirty="0">
+                <a:latin typeface="Times New Roman" panose="02020603050405020304" pitchFamily="18" charset="0"/>
+                <a:cs typeface="Times New Roman" panose="02020603050405020304" pitchFamily="18" charset="0"/>
+              </a:rPr>
+              <a:t> Thanh </a:t>
+            </a:r>
+            <a:r>
+              <a:rPr lang="en-US" sz="2000" dirty="0" err="1">
+                <a:latin typeface="Times New Roman" panose="02020603050405020304" pitchFamily="18" charset="0"/>
+                <a:cs typeface="Times New Roman" panose="02020603050405020304" pitchFamily="18" charset="0"/>
+              </a:rPr>
+              <a:t>Trúc</a:t>
+            </a:r>
+            <a:r>
+              <a:rPr lang="en-US" sz="2000" dirty="0">
+                <a:latin typeface="Times New Roman" panose="02020603050405020304" pitchFamily="18" charset="0"/>
+                <a:cs typeface="Times New Roman" panose="02020603050405020304" pitchFamily="18" charset="0"/>
+              </a:rPr>
+              <a:t>, </a:t>
+            </a:r>
+            <a:r>
+              <a:rPr lang="en-US" sz="2000" dirty="0" err="1">
+                <a:latin typeface="Times New Roman" panose="02020603050405020304" pitchFamily="18" charset="0"/>
+                <a:cs typeface="Times New Roman" panose="02020603050405020304" pitchFamily="18" charset="0"/>
+              </a:rPr>
+              <a:t>Ths</a:t>
+            </a:r>
+            <a:r>
+              <a:rPr lang="en-US" sz="2000" dirty="0">
+                <a:latin typeface="Times New Roman" panose="02020603050405020304" pitchFamily="18" charset="0"/>
+                <a:cs typeface="Times New Roman" panose="02020603050405020304" pitchFamily="18" charset="0"/>
+              </a:rPr>
+              <a:t>. </a:t>
+            </a:r>
+            <a:r>
+              <a:rPr lang="en-US" sz="2000" dirty="0" err="1">
+                <a:latin typeface="Times New Roman" panose="02020603050405020304" pitchFamily="18" charset="0"/>
+                <a:cs typeface="Times New Roman" panose="02020603050405020304" pitchFamily="18" charset="0"/>
+              </a:rPr>
+              <a:t>Nguyễn</a:t>
+            </a:r>
+            <a:r>
+              <a:rPr lang="en-US" sz="2000" dirty="0">
+                <a:latin typeface="Times New Roman" panose="02020603050405020304" pitchFamily="18" charset="0"/>
+                <a:cs typeface="Times New Roman" panose="02020603050405020304" pitchFamily="18" charset="0"/>
+              </a:rPr>
+              <a:t> </a:t>
+            </a:r>
+            <a:r>
+              <a:rPr lang="en-US" sz="2000" dirty="0" err="1">
+                <a:latin typeface="Times New Roman" panose="02020603050405020304" pitchFamily="18" charset="0"/>
+                <a:cs typeface="Times New Roman" panose="02020603050405020304" pitchFamily="18" charset="0"/>
+              </a:rPr>
+              <a:t>Công</a:t>
+            </a:r>
+            <a:r>
+              <a:rPr lang="en-US" sz="2000" dirty="0">
+                <a:latin typeface="Times New Roman" panose="02020603050405020304" pitchFamily="18" charset="0"/>
+                <a:cs typeface="Times New Roman" panose="02020603050405020304" pitchFamily="18" charset="0"/>
+              </a:rPr>
+              <a:t> </a:t>
+            </a:r>
+            <a:r>
+              <a:rPr lang="en-US" sz="2000" dirty="0" err="1">
+                <a:latin typeface="Times New Roman" panose="02020603050405020304" pitchFamily="18" charset="0"/>
+                <a:cs typeface="Times New Roman" panose="02020603050405020304" pitchFamily="18" charset="0"/>
+              </a:rPr>
+              <a:t>Hoan</a:t>
+            </a:r>
+            <a:endParaRPr lang="en-US" sz="2000" dirty="0">
+              <a:latin typeface="Times New Roman" panose="02020603050405020304" pitchFamily="18" charset="0"/>
+              <a:cs typeface="Times New Roman" panose="02020603050405020304" pitchFamily="18" charset="0"/>
+            </a:endParaRPr>
+          </a:p>
+          <a:p>
+            <a:pPr marL="285750" indent="-285750">
+              <a:buFontTx/>
+              <a:buChar char="-"/>
+            </a:pPr>
+            <a:endParaRPr lang="en-US" dirty="0">
+              <a:latin typeface="Times New Roman" panose="02020603050405020304" pitchFamily="18" charset="0"/>
+              <a:cs typeface="Times New Roman" panose="02020603050405020304" pitchFamily="18" charset="0"/>
+            </a:endParaRPr>
+          </a:p>
+          <a:p>
+            <a:endParaRPr lang="en-US" dirty="0"/>
+          </a:p>
+          <a:p>
+            <a:endParaRPr lang="en-US" dirty="0"/>
+          </a:p>
+        </p:txBody>
+      </p:sp>
+    </p:spTree>
+    <p:extLst>
+      <p:ext uri="{BB962C8B-B14F-4D97-AF65-F5344CB8AC3E}">
+        <p14:creationId xmlns:p14="http://schemas.microsoft.com/office/powerpoint/2010/main" val="4156840940"/>
+      </p:ext>
+    </p:extLst>
+  </p:cSld>
+  <p:clrMapOvr>
+    <a:masterClrMapping/>
+  </p:clrMapOvr>
+  <p:timing>
+    <p:tnLst>
+      <p:par>
+        <p:cTn id="1" dur="indefinite" restart="never" nodeType="tmRoot">
+          <p:childTnLst>
+            <p:seq concurrent="1" nextAc="seek">
+              <p:cTn id="2" dur="indefinite" nodeType="mainSeq">
+                <p:childTnLst>
+                  <p:par>
+                    <p:cTn id="3" fill="hold">
+                      <p:stCondLst>
+                        <p:cond delay="indefinite"/>
+                      </p:stCondLst>
+                      <p:childTnLst>
+                        <p:par>
+                          <p:cTn id="4" fill="hold">
+                            <p:stCondLst>
+                              <p:cond delay="0"/>
+                            </p:stCondLst>
+                            <p:childTnLst>
+                              <p:par>
+                                <p:cTn id="5" presetID="18" presetClass="entr" presetSubtype="12" fill="hold" grpId="0" nodeType="clickEffect">
+                                  <p:stCondLst>
+                                    <p:cond delay="0"/>
+                                  </p:stCondLst>
+                                  <p:childTnLst>
+                                    <p:set>
+                                      <p:cBhvr>
+                                        <p:cTn id="6" dur="1" fill="hold">
+                                          <p:stCondLst>
+                                            <p:cond delay="0"/>
+                                          </p:stCondLst>
+                                        </p:cTn>
+                                        <p:tgtEl>
+                                          <p:spTgt spid="5"/>
+                                        </p:tgtEl>
+                                        <p:attrNameLst>
+                                          <p:attrName>style.visibility</p:attrName>
+                                        </p:attrNameLst>
+                                      </p:cBhvr>
+                                      <p:to>
+                                        <p:strVal val="visible"/>
+                                      </p:to>
+                                    </p:set>
+                                    <p:animEffect transition="in" filter="strips(downLeft)">
+                                      <p:cBhvr>
+                                        <p:cTn id="7" dur="500"/>
+                                        <p:tgtEl>
+                                          <p:spTgt spid="5"/>
+                                        </p:tgtEl>
+                                      </p:cBhvr>
+                                    </p:animEffect>
+                                  </p:childTnLst>
+                                </p:cTn>
+                              </p:par>
+                            </p:childTnLst>
+                          </p:cTn>
+                        </p:par>
+                      </p:childTnLst>
+                    </p:cTn>
+                  </p:par>
+                </p:childTnLst>
+              </p:cTn>
+              <p:prevCondLst>
+                <p:cond evt="onPrev" delay="0">
+                  <p:tgtEl>
+                    <p:sldTgt/>
+                  </p:tgtEl>
+                </p:cond>
+              </p:prevCondLst>
+              <p:nextCondLst>
+                <p:cond evt="onNext" delay="0">
+                  <p:tgtEl>
+                    <p:sldTgt/>
+                  </p:tgtEl>
+                </p:cond>
+              </p:nextCondLst>
+            </p:seq>
+          </p:childTnLst>
+        </p:cTn>
+      </p:par>
+    </p:tnLst>
+    <p:bldLst>
+      <p:bldP spid="5" grpId="0"/>
+    </p:bldLst>
+  </p:timing>
+</p:sld>
+</file>
+
+<file path=ppt/slides/slide15.xml><?xml version="1.0" encoding="utf-8"?>
+<p:sld xmlns:a="http://schemas.openxmlformats.org/drawingml/2006/main" xmlns:r="http://schemas.openxmlformats.org/officeDocument/2006/relationships" xmlns:p="http://schemas.openxmlformats.org/presentationml/2006/main">
+  <p:cSld>
+    <p:spTree>
+      <p:nvGrpSpPr>
+        <p:cNvPr id="1" name=""/>
+        <p:cNvGrpSpPr/>
+        <p:nvPr/>
+      </p:nvGrpSpPr>
+      <p:grpSpPr>
+        <a:xfrm>
+          <a:off x="0" y="0"/>
+          <a:ext cx="0" cy="0"/>
+          <a:chOff x="0" y="0"/>
+          <a:chExt cx="0" cy="0"/>
+        </a:xfrm>
+      </p:grpSpPr>
+      <p:sp>
+        <p:nvSpPr>
+          <p:cNvPr id="4" name="Slide Number Placeholder 3">
+            <a:extLst>
+              <a:ext uri="{FF2B5EF4-FFF2-40B4-BE49-F238E27FC236}">
                 <a16:creationId xmlns:a16="http://schemas.microsoft.com/office/drawing/2014/main" id="{8EBC6D6B-A638-4445-973E-C57DA4B2537A}"/>
               </a:ext>
             </a:extLst>
@@ -12182,7 +12744,7 @@
           <a:p>
             <a:fld id="{6BB9AED3-D2BB-49A3-B8E7-A4A64ED2F011}" type="slidenum">
               <a:rPr lang="en-US" smtClean="0"/>
-              <a:t>14</a:t>
+              <a:t>15</a:t>
             </a:fld>
             <a:endParaRPr lang="en-US"/>
           </a:p>
@@ -12437,6 +12999,9 @@
               </a:rPr>
               <a:t> </a:t>
             </a:r>
+          </a:p>
+          <a:p>
+            <a:pPr algn="ctr"/>
             <a:r>
               <a:rPr lang="en-US" sz="3500" b="1" dirty="0" err="1">
                 <a:solidFill>
@@ -12898,8 +13463,8 @@
         </p:blipFill>
         <p:spPr>
           <a:xfrm>
-            <a:off x="3763618" y="3300101"/>
-            <a:ext cx="4664764" cy="3204014"/>
+            <a:off x="4297017" y="3298881"/>
+            <a:ext cx="3597965" cy="2624470"/>
           </a:xfrm>
           <a:prstGeom prst="rect">
             <a:avLst/>
@@ -14941,15 +15506,33 @@
                                   </p:childTnLst>
                                 </p:cTn>
                               </p:par>
+                            </p:childTnLst>
+                          </p:cTn>
+                        </p:par>
+                      </p:childTnLst>
+                    </p:cTn>
+                  </p:par>
+                  <p:par>
+                    <p:cTn id="16" fill="hold">
+                      <p:stCondLst>
+                        <p:cond delay="indefinite"/>
+                      </p:stCondLst>
+                      <p:childTnLst>
+                        <p:par>
+                          <p:cTn id="17" fill="hold">
+                            <p:stCondLst>
+                              <p:cond delay="0"/>
+                            </p:stCondLst>
+                            <p:childTnLst>
                               <p:par>
-                                <p:cTn id="16" presetID="12" presetClass="entr" presetSubtype="4" fill="hold" grpId="0" nodeType="withEffect">
+                                <p:cTn id="18" presetID="17" presetClass="entr" presetSubtype="10" fill="hold" grpId="0" nodeType="clickEffect">
                                   <p:stCondLst>
                                     <p:cond delay="0"/>
                                   </p:stCondLst>
                                   <p:childTnLst>
                                     <p:set>
                                       <p:cBhvr>
-                                        <p:cTn id="17" dur="1" fill="hold">
+                                        <p:cTn id="19" dur="1" fill="hold">
                                           <p:stCondLst>
                                             <p:cond delay="0"/>
                                           </p:stCondLst>
@@ -14966,36 +15549,51 @@
                                       </p:to>
                                     </p:set>
                                     <p:anim calcmode="lin" valueType="num">
-                                      <p:cBhvr additive="base">
-                                        <p:cTn id="18" dur="500"/>
+                                      <p:cBhvr>
+                                        <p:cTn id="20" dur="500" fill="hold"/>
                                         <p:tgtEl>
                                           <p:spTgt spid="6"/>
                                         </p:tgtEl>
                                         <p:attrNameLst>
-                                          <p:attrName>ppt_y</p:attrName>
+                                          <p:attrName>ppt_w</p:attrName>
                                         </p:attrNameLst>
                                       </p:cBhvr>
                                       <p:tavLst>
                                         <p:tav tm="0">
                                           <p:val>
-                                            <p:strVal val="#ppt_y+#ppt_h*1.125000"/>
+                                            <p:fltVal val="0"/>
                                           </p:val>
                                         </p:tav>
                                         <p:tav tm="100000">
                                           <p:val>
-                                            <p:strVal val="#ppt_y"/>
+                                            <p:strVal val="#ppt_w"/>
                                           </p:val>
                                         </p:tav>
                                       </p:tavLst>
                                     </p:anim>
-                                    <p:animEffect transition="in" filter="wipe(up)">
+                                    <p:anim calcmode="lin" valueType="num">
                                       <p:cBhvr>
-                                        <p:cTn id="19" dur="500"/>
+                                        <p:cTn id="21" dur="500" fill="hold"/>
                                         <p:tgtEl>
                                           <p:spTgt spid="6"/>
                                         </p:tgtEl>
+                                        <p:attrNameLst>
+                                          <p:attrName>ppt_h</p:attrName>
+                                        </p:attrNameLst>
                                       </p:cBhvr>
-                                    </p:animEffect>
+                                      <p:tavLst>
+                                        <p:tav tm="0">
+                                          <p:val>
+                                            <p:strVal val="#ppt_h"/>
+                                          </p:val>
+                                        </p:tav>
+                                        <p:tav tm="100000">
+                                          <p:val>
+                                            <p:strVal val="#ppt_h"/>
+                                          </p:val>
+                                        </p:tav>
+                                      </p:tavLst>
+                                    </p:anim>
                                   </p:childTnLst>
                                 </p:cTn>
                               </p:par>
@@ -15313,7 +15911,7 @@
         </p:nvSpPr>
         <p:spPr>
           <a:xfrm>
-            <a:off x="1600200" y="2418347"/>
+            <a:off x="1491815" y="2113547"/>
             <a:ext cx="7206916" cy="2400657"/>
           </a:xfrm>
           <a:prstGeom prst="rect">
@@ -16221,39 +16819,6 @@
           </a:p>
         </p:txBody>
       </p:sp>
-      <p:pic>
-        <p:nvPicPr>
-          <p:cNvPr id="4" name="Picture 3" descr="DTH Share Mô Hình Waterfall 7 tầng"/>
-          <p:cNvPicPr/>
-          <p:nvPr/>
-        </p:nvPicPr>
-        <p:blipFill>
-          <a:blip r:embed="rId2">
-            <a:extLst>
-              <a:ext uri="{28A0092B-C50C-407E-A947-70E740481C1C}">
-                <a14:useLocalDpi xmlns:a14="http://schemas.microsoft.com/office/drawing/2010/main" val="0"/>
-              </a:ext>
-            </a:extLst>
-          </a:blip>
-          <a:srcRect/>
-          <a:stretch>
-            <a:fillRect/>
-          </a:stretch>
-        </p:blipFill>
-        <p:spPr bwMode="auto">
-          <a:xfrm>
-            <a:off x="1944260" y="2938295"/>
-            <a:ext cx="8303479" cy="3363112"/>
-          </a:xfrm>
-          <a:prstGeom prst="rect">
-            <a:avLst/>
-          </a:prstGeom>
-          <a:noFill/>
-          <a:ln>
-            <a:noFill/>
-          </a:ln>
-        </p:spPr>
-      </p:pic>
       <p:sp>
         <p:nvSpPr>
           <p:cNvPr id="7" name="Slide Number Placeholder 6"/>
@@ -16277,6 +16842,42 @@
           </a:p>
         </p:txBody>
       </p:sp>
+      <p:pic>
+        <p:nvPicPr>
+          <p:cNvPr id="6" name="Picture 5">
+            <a:extLst>
+              <a:ext uri="{FF2B5EF4-FFF2-40B4-BE49-F238E27FC236}">
+                <a16:creationId xmlns:a16="http://schemas.microsoft.com/office/drawing/2014/main" id="{3DBD3923-D78A-418A-8885-87E21809E495}"/>
+              </a:ext>
+            </a:extLst>
+          </p:cNvPr>
+          <p:cNvPicPr>
+            <a:picLocks noChangeAspect="1"/>
+          </p:cNvPicPr>
+          <p:nvPr/>
+        </p:nvPicPr>
+        <p:blipFill>
+          <a:blip r:embed="rId2">
+            <a:extLst>
+              <a:ext uri="{28A0092B-C50C-407E-A947-70E740481C1C}">
+                <a14:useLocalDpi xmlns:a14="http://schemas.microsoft.com/office/drawing/2010/main" val="0"/>
+              </a:ext>
+            </a:extLst>
+          </a:blip>
+          <a:stretch>
+            <a:fillRect/>
+          </a:stretch>
+        </p:blipFill>
+        <p:spPr>
+          <a:xfrm>
+            <a:off x="3504539" y="2889394"/>
+            <a:ext cx="5182296" cy="3176443"/>
+          </a:xfrm>
+          <a:prstGeom prst="rect">
+            <a:avLst/>
+          </a:prstGeom>
+        </p:spPr>
+      </p:pic>
     </p:spTree>
   </p:cSld>
   <p:clrMapOvr>
@@ -16521,7 +17122,7 @@
                             </p:stCondLst>
                             <p:childTnLst>
                               <p:par>
-                                <p:cTn id="17" presetID="6" presetClass="entr" presetSubtype="16" fill="hold" nodeType="clickEffect">
+                                <p:cTn id="17" presetID="13" presetClass="entr" presetSubtype="16" fill="hold" nodeType="clickEffect">
                                   <p:stCondLst>
                                     <p:cond delay="0"/>
                                   </p:stCondLst>
@@ -16534,7 +17135,7 @@
                                           </p:stCondLst>
                                         </p:cTn>
                                         <p:tgtEl>
-                                          <p:spTgt spid="4"/>
+                                          <p:spTgt spid="6"/>
                                         </p:tgtEl>
                                         <p:attrNameLst>
                                           <p:attrName>style.visibility</p:attrName>
@@ -16544,11 +17145,11 @@
                                         <p:strVal val="visible"/>
                                       </p:to>
                                     </p:set>
-                                    <p:animEffect transition="in" filter="circle(in)">
+                                    <p:animEffect transition="in" filter="plus(in)">
                                       <p:cBhvr>
                                         <p:cTn id="19" dur="2000"/>
                                         <p:tgtEl>
-                                          <p:spTgt spid="4"/>
+                                          <p:spTgt spid="6"/>
                                         </p:tgtEl>
                                       </p:cBhvr>
                                     </p:animEffect>
@@ -20116,39 +20717,7 @@
                 <a:ea typeface="Tahoma" panose="020B0604030504040204" pitchFamily="34" charset="0"/>
                 <a:cs typeface="Tahoma" panose="020B0604030504040204" pitchFamily="34" charset="0"/>
               </a:rPr>
-              <a:t>nhỏ</a:t>
-            </a:r>
-            <a:r>
-              <a:rPr lang="en-GB" sz="2500" dirty="0">
-                <a:latin typeface="Times New Roman" panose="02020603050405020304" pitchFamily="18" charset="0"/>
-                <a:ea typeface="Tahoma" panose="020B0604030504040204" pitchFamily="34" charset="0"/>
-                <a:cs typeface="Tahoma" panose="020B0604030504040204" pitchFamily="34" charset="0"/>
-              </a:rPr>
-              <a:t> </a:t>
-            </a:r>
-            <a:r>
-              <a:rPr lang="en-GB" sz="2500" dirty="0" err="1">
-                <a:latin typeface="Times New Roman" panose="02020603050405020304" pitchFamily="18" charset="0"/>
-                <a:ea typeface="Tahoma" panose="020B0604030504040204" pitchFamily="34" charset="0"/>
-                <a:cs typeface="Tahoma" panose="020B0604030504040204" pitchFamily="34" charset="0"/>
-              </a:rPr>
-              <a:t>hơn</a:t>
-            </a:r>
-            <a:r>
-              <a:rPr lang="en-GB" sz="2500" dirty="0">
-                <a:latin typeface="Times New Roman" panose="02020603050405020304" pitchFamily="18" charset="0"/>
-                <a:ea typeface="Tahoma" panose="020B0604030504040204" pitchFamily="34" charset="0"/>
-                <a:cs typeface="Tahoma" panose="020B0604030504040204" pitchFamily="34" charset="0"/>
-              </a:rPr>
-              <a:t>, </a:t>
-            </a:r>
-            <a:r>
-              <a:rPr lang="en-GB" sz="2500" dirty="0" err="1">
-                <a:latin typeface="Times New Roman" panose="02020603050405020304" pitchFamily="18" charset="0"/>
-                <a:ea typeface="Tahoma" panose="020B0604030504040204" pitchFamily="34" charset="0"/>
-                <a:cs typeface="Tahoma" panose="020B0604030504040204" pitchFamily="34" charset="0"/>
-              </a:rPr>
-              <a:t>nơi</a:t>
+              <a:t>có</a:t>
             </a:r>
             <a:r>
               <a:rPr lang="en-GB" sz="2500" dirty="0">

</xml_diff>